<commit_message>
Changed ppt of diagram of Component interactions for delete 1 command to match Typed
</commit_message>
<xml_diff>
--- a/docs/diagrams/HighLevelSequenceDiagrams.pptx
+++ b/docs/diagrams/HighLevelSequenceDiagrams.pptx
@@ -107,6 +107,22 @@
       </a:defRPr>
     </a:lvl9pPr>
   </p:defaultTextStyle>
+  <p:extLst>
+    <p:ext uri="{EFAFB233-063F-42B5-8137-9DF3F51BA10A}">
+      <p15:sldGuideLst xmlns:p15="http://schemas.microsoft.com/office/powerpoint/2012/main">
+        <p15:guide id="1" orient="horz" pos="1488">
+          <p15:clr>
+            <a:srgbClr val="A4A3A4"/>
+          </p15:clr>
+        </p15:guide>
+        <p15:guide id="2" pos="2880">
+          <p15:clr>
+            <a:srgbClr val="A4A3A4"/>
+          </p15:clr>
+        </p15:guide>
+      </p15:sldGuideLst>
+    </p:ext>
+  </p:extLst>
 </p:presentation>
 </file>
 
@@ -192,7 +208,7 @@
           <a:p>
             <a:fld id="{F5CC4B3F-88C1-4FFA-B1B6-F41C21DC6924}" type="datetimeFigureOut">
               <a:rPr lang="en-US" smtClean="0"/>
-              <a:t>10/16/2016</a:t>
+              <a:t>4/8/17</a:t>
             </a:fld>
             <a:endParaRPr lang="en-US"/>
           </a:p>
@@ -641,7 +657,7 @@
           <a:p>
             <a:fld id="{78C97017-6FC3-485B-9764-EAC9E56C1D49}" type="datetimeFigureOut">
               <a:rPr lang="en-US" smtClean="0"/>
-              <a:t>10/16/2016</a:t>
+              <a:t>4/8/17</a:t>
             </a:fld>
             <a:endParaRPr lang="en-US"/>
           </a:p>
@@ -811,7 +827,7 @@
           <a:p>
             <a:fld id="{78C97017-6FC3-485B-9764-EAC9E56C1D49}" type="datetimeFigureOut">
               <a:rPr lang="en-US" smtClean="0"/>
-              <a:t>10/16/2016</a:t>
+              <a:t>4/8/17</a:t>
             </a:fld>
             <a:endParaRPr lang="en-US"/>
           </a:p>
@@ -991,7 +1007,7 @@
           <a:p>
             <a:fld id="{78C97017-6FC3-485B-9764-EAC9E56C1D49}" type="datetimeFigureOut">
               <a:rPr lang="en-US" smtClean="0"/>
-              <a:t>10/16/2016</a:t>
+              <a:t>4/8/17</a:t>
             </a:fld>
             <a:endParaRPr lang="en-US"/>
           </a:p>
@@ -1161,7 +1177,7 @@
           <a:p>
             <a:fld id="{78C97017-6FC3-485B-9764-EAC9E56C1D49}" type="datetimeFigureOut">
               <a:rPr lang="en-US" smtClean="0"/>
-              <a:t>10/16/2016</a:t>
+              <a:t>4/8/17</a:t>
             </a:fld>
             <a:endParaRPr lang="en-US"/>
           </a:p>
@@ -1407,7 +1423,7 @@
           <a:p>
             <a:fld id="{78C97017-6FC3-485B-9764-EAC9E56C1D49}" type="datetimeFigureOut">
               <a:rPr lang="en-US" smtClean="0"/>
-              <a:t>10/16/2016</a:t>
+              <a:t>4/8/17</a:t>
             </a:fld>
             <a:endParaRPr lang="en-US"/>
           </a:p>
@@ -1695,7 +1711,7 @@
           <a:p>
             <a:fld id="{78C97017-6FC3-485B-9764-EAC9E56C1D49}" type="datetimeFigureOut">
               <a:rPr lang="en-US" smtClean="0"/>
-              <a:t>10/16/2016</a:t>
+              <a:t>4/8/17</a:t>
             </a:fld>
             <a:endParaRPr lang="en-US"/>
           </a:p>
@@ -2117,7 +2133,7 @@
           <a:p>
             <a:fld id="{78C97017-6FC3-485B-9764-EAC9E56C1D49}" type="datetimeFigureOut">
               <a:rPr lang="en-US" smtClean="0"/>
-              <a:t>10/16/2016</a:t>
+              <a:t>4/8/17</a:t>
             </a:fld>
             <a:endParaRPr lang="en-US"/>
           </a:p>
@@ -2235,7 +2251,7 @@
           <a:p>
             <a:fld id="{78C97017-6FC3-485B-9764-EAC9E56C1D49}" type="datetimeFigureOut">
               <a:rPr lang="en-US" smtClean="0"/>
-              <a:t>10/16/2016</a:t>
+              <a:t>4/8/17</a:t>
             </a:fld>
             <a:endParaRPr lang="en-US"/>
           </a:p>
@@ -2330,7 +2346,7 @@
           <a:p>
             <a:fld id="{78C97017-6FC3-485B-9764-EAC9E56C1D49}" type="datetimeFigureOut">
               <a:rPr lang="en-US" smtClean="0"/>
-              <a:t>10/16/2016</a:t>
+              <a:t>4/8/17</a:t>
             </a:fld>
             <a:endParaRPr lang="en-US"/>
           </a:p>
@@ -2607,7 +2623,7 @@
           <a:p>
             <a:fld id="{78C97017-6FC3-485B-9764-EAC9E56C1D49}" type="datetimeFigureOut">
               <a:rPr lang="en-US" smtClean="0"/>
-              <a:t>10/16/2016</a:t>
+              <a:t>4/8/17</a:t>
             </a:fld>
             <a:endParaRPr lang="en-US"/>
           </a:p>
@@ -2860,7 +2876,7 @@
           <a:p>
             <a:fld id="{78C97017-6FC3-485B-9764-EAC9E56C1D49}" type="datetimeFigureOut">
               <a:rPr lang="en-US" smtClean="0"/>
-              <a:t>10/16/2016</a:t>
+              <a:t>4/8/17</a:t>
             </a:fld>
             <a:endParaRPr lang="en-US"/>
           </a:p>
@@ -3073,7 +3089,7 @@
           <a:p>
             <a:fld id="{78C97017-6FC3-485B-9764-EAC9E56C1D49}" type="datetimeFigureOut">
               <a:rPr lang="en-US" smtClean="0"/>
-              <a:t>10/16/2016</a:t>
+              <a:t>4/8/17</a:t>
             </a:fld>
             <a:endParaRPr lang="en-US"/>
           </a:p>
@@ -4310,7 +4326,7 @@
                   <a:srgbClr val="7030A0"/>
                 </a:solidFill>
               </a:rPr>
-              <a:t>deletePerson</a:t>
+              <a:t>deleteTask</a:t>
             </a:r>
             <a:r>
               <a:rPr lang="en-US" sz="1400" dirty="0" smtClean="0">
@@ -4318,7 +4334,7 @@
                   <a:srgbClr val="7030A0"/>
                 </a:solidFill>
               </a:rPr>
-              <a:t>(p)</a:t>
+              <a:t>(t)</a:t>
             </a:r>
             <a:endParaRPr lang="en-US" sz="1400" dirty="0">
               <a:solidFill>
@@ -4368,7 +4384,7 @@
                   </a:schemeClr>
                 </a:solidFill>
               </a:rPr>
-              <a:t>AddressBookChangedEvent</a:t>
+              <a:t>TaskManagerChangedEvent</a:t>
             </a:r>
             <a:r>
               <a:rPr lang="en-US" sz="1400" dirty="0" smtClean="0">
@@ -4910,7 +4926,7 @@
         </p:nvSpPr>
         <p:spPr>
           <a:xfrm>
-            <a:off x="1810094" y="4797674"/>
+            <a:off x="1828800" y="4797674"/>
             <a:ext cx="2716635" cy="215444"/>
           </a:xfrm>
           <a:prstGeom prst="rect">
@@ -4942,7 +4958,7 @@
                   </a:schemeClr>
                 </a:solidFill>
               </a:rPr>
-              <a:t>AddressBookChangedEvent</a:t>
+              <a:t>TaskManagerChangedEvent</a:t>
             </a:r>
             <a:r>
               <a:rPr lang="en-US" sz="1400" dirty="0" smtClean="0">
@@ -5314,7 +5330,7 @@
                   </a:schemeClr>
                 </a:solidFill>
               </a:rPr>
-              <a:t>handleAddresssBookChangedEvent</a:t>
+              <a:t>handleTaskManagerChangedEvent</a:t>
             </a:r>
             <a:r>
               <a:rPr lang="en-US" sz="1400" dirty="0" smtClean="0">
@@ -5625,7 +5641,7 @@
                   <a:srgbClr val="00B050"/>
                 </a:solidFill>
               </a:rPr>
-              <a:t>handleAddresssBookChangedEvent</a:t>
+              <a:t>handleTaskManagerChangedEvent</a:t>
             </a:r>
             <a:r>
               <a:rPr lang="en-US" sz="1400" dirty="0" smtClean="0">

</xml_diff>